<commit_message>
FOR AND BAC WORKING
</commit_message>
<xml_diff>
--- a/joystick_graph.pptx
+++ b/joystick_graph.pptx
@@ -260,7 +260,7 @@
           <a:p>
             <a:fld id="{3432C9A6-A899-4CC2-9F2E-309C1BFF6B29}" type="datetimeFigureOut">
               <a:rPr lang="hu-HU" smtClean="0"/>
-              <a:t>2025. 05. 15.</a:t>
+              <a:t>2025. 05. 16.</a:t>
             </a:fld>
             <a:endParaRPr lang="hu-HU"/>
           </a:p>
@@ -458,7 +458,7 @@
           <a:p>
             <a:fld id="{3432C9A6-A899-4CC2-9F2E-309C1BFF6B29}" type="datetimeFigureOut">
               <a:rPr lang="hu-HU" smtClean="0"/>
-              <a:t>2025. 05. 15.</a:t>
+              <a:t>2025. 05. 16.</a:t>
             </a:fld>
             <a:endParaRPr lang="hu-HU"/>
           </a:p>
@@ -666,7 +666,7 @@
           <a:p>
             <a:fld id="{3432C9A6-A899-4CC2-9F2E-309C1BFF6B29}" type="datetimeFigureOut">
               <a:rPr lang="hu-HU" smtClean="0"/>
-              <a:t>2025. 05. 15.</a:t>
+              <a:t>2025. 05. 16.</a:t>
             </a:fld>
             <a:endParaRPr lang="hu-HU"/>
           </a:p>
@@ -864,7 +864,7 @@
           <a:p>
             <a:fld id="{3432C9A6-A899-4CC2-9F2E-309C1BFF6B29}" type="datetimeFigureOut">
               <a:rPr lang="hu-HU" smtClean="0"/>
-              <a:t>2025. 05. 15.</a:t>
+              <a:t>2025. 05. 16.</a:t>
             </a:fld>
             <a:endParaRPr lang="hu-HU"/>
           </a:p>
@@ -1139,7 +1139,7 @@
           <a:p>
             <a:fld id="{3432C9A6-A899-4CC2-9F2E-309C1BFF6B29}" type="datetimeFigureOut">
               <a:rPr lang="hu-HU" smtClean="0"/>
-              <a:t>2025. 05. 15.</a:t>
+              <a:t>2025. 05. 16.</a:t>
             </a:fld>
             <a:endParaRPr lang="hu-HU"/>
           </a:p>
@@ -1404,7 +1404,7 @@
           <a:p>
             <a:fld id="{3432C9A6-A899-4CC2-9F2E-309C1BFF6B29}" type="datetimeFigureOut">
               <a:rPr lang="hu-HU" smtClean="0"/>
-              <a:t>2025. 05. 15.</a:t>
+              <a:t>2025. 05. 16.</a:t>
             </a:fld>
             <a:endParaRPr lang="hu-HU"/>
           </a:p>
@@ -1816,7 +1816,7 @@
           <a:p>
             <a:fld id="{3432C9A6-A899-4CC2-9F2E-309C1BFF6B29}" type="datetimeFigureOut">
               <a:rPr lang="hu-HU" smtClean="0"/>
-              <a:t>2025. 05. 15.</a:t>
+              <a:t>2025. 05. 16.</a:t>
             </a:fld>
             <a:endParaRPr lang="hu-HU"/>
           </a:p>
@@ -1957,7 +1957,7 @@
           <a:p>
             <a:fld id="{3432C9A6-A899-4CC2-9F2E-309C1BFF6B29}" type="datetimeFigureOut">
               <a:rPr lang="hu-HU" smtClean="0"/>
-              <a:t>2025. 05. 15.</a:t>
+              <a:t>2025. 05. 16.</a:t>
             </a:fld>
             <a:endParaRPr lang="hu-HU"/>
           </a:p>
@@ -2070,7 +2070,7 @@
           <a:p>
             <a:fld id="{3432C9A6-A899-4CC2-9F2E-309C1BFF6B29}" type="datetimeFigureOut">
               <a:rPr lang="hu-HU" smtClean="0"/>
-              <a:t>2025. 05. 15.</a:t>
+              <a:t>2025. 05. 16.</a:t>
             </a:fld>
             <a:endParaRPr lang="hu-HU"/>
           </a:p>
@@ -2381,7 +2381,7 @@
           <a:p>
             <a:fld id="{3432C9A6-A899-4CC2-9F2E-309C1BFF6B29}" type="datetimeFigureOut">
               <a:rPr lang="hu-HU" smtClean="0"/>
-              <a:t>2025. 05. 15.</a:t>
+              <a:t>2025. 05. 16.</a:t>
             </a:fld>
             <a:endParaRPr lang="hu-HU"/>
           </a:p>
@@ -2669,7 +2669,7 @@
           <a:p>
             <a:fld id="{3432C9A6-A899-4CC2-9F2E-309C1BFF6B29}" type="datetimeFigureOut">
               <a:rPr lang="hu-HU" smtClean="0"/>
-              <a:t>2025. 05. 15.</a:t>
+              <a:t>2025. 05. 16.</a:t>
             </a:fld>
             <a:endParaRPr lang="hu-HU"/>
           </a:p>
@@ -2910,7 +2910,7 @@
           <a:p>
             <a:fld id="{3432C9A6-A899-4CC2-9F2E-309C1BFF6B29}" type="datetimeFigureOut">
               <a:rPr lang="hu-HU" smtClean="0"/>
-              <a:t>2025. 05. 15.</a:t>
+              <a:t>2025. 05. 16.</a:t>
             </a:fld>
             <a:endParaRPr lang="hu-HU"/>
           </a:p>
@@ -5411,7 +5411,7 @@
         <p:spPr>
           <a:xfrm>
             <a:off x="8680785" y="-44745"/>
-            <a:ext cx="3534406" cy="6924973"/>
+            <a:ext cx="3534406" cy="7109639"/>
           </a:xfrm>
           <a:prstGeom prst="rect">
             <a:avLst/>
@@ -5861,7 +5861,24 @@
               <a:rPr lang="hu-HU" sz="1200" dirty="0">
                 <a:latin typeface="Consolas" panose="020B0609020204030204" pitchFamily="49" charset="0"/>
               </a:rPr>
-              <a:t> PWM_MAX_FOR </a:t>
+              <a:t> CEN </a:t>
+            </a:r>
+            <a:r>
+              <a:rPr lang="hu-HU" sz="1200">
+                <a:latin typeface="Consolas" panose="020B0609020204030204" pitchFamily="49" charset="0"/>
+              </a:rPr>
+              <a:t>+ PWM_MAX_FOR +</a:t>
+            </a:r>
+            <a:endParaRPr lang="hu-HU" sz="1200" dirty="0">
+              <a:latin typeface="Consolas" panose="020B0609020204030204" pitchFamily="49" charset="0"/>
+            </a:endParaRPr>
+          </a:p>
+          <a:p>
+            <a:r>
+              <a:rPr lang="hu-HU" sz="1200" dirty="0">
+                <a:latin typeface="Consolas" panose="020B0609020204030204" pitchFamily="49" charset="0"/>
+              </a:rPr>
+              <a:t>  ( </a:t>
             </a:r>
             <a:r>
               <a:rPr lang="hu-HU" sz="1200" dirty="0">
@@ -5873,21 +5890,13 @@
                 </a:solidFill>
                 <a:latin typeface="Consolas" panose="020B0609020204030204" pitchFamily="49" charset="0"/>
               </a:rPr>
-              <a:t>*</a:t>
-            </a:r>
-            <a:r>
-              <a:rPr lang="hu-HU" sz="1200" dirty="0">
-                <a:latin typeface="Consolas" panose="020B0609020204030204" pitchFamily="49" charset="0"/>
-              </a:rPr>
-              <a:t> </a:t>
-            </a:r>
-          </a:p>
-          <a:p>
-            <a:r>
-              <a:rPr lang="hu-HU" sz="1200" dirty="0">
-                <a:latin typeface="Consolas" panose="020B0609020204030204" pitchFamily="49" charset="0"/>
-              </a:rPr>
-              <a:t>  </a:t>
+              <a:t>( </a:t>
+            </a:r>
+            <a:r>
+              <a:rPr lang="hu-HU" sz="1200" dirty="0">
+                <a:latin typeface="Consolas" panose="020B0609020204030204" pitchFamily="49" charset="0"/>
+              </a:rPr>
+              <a:t>Y </a:t>
             </a:r>
             <a:r>
               <a:rPr lang="hu-HU" sz="1200" dirty="0">
@@ -5899,13 +5908,13 @@
                 </a:solidFill>
                 <a:latin typeface="Consolas" panose="020B0609020204030204" pitchFamily="49" charset="0"/>
               </a:rPr>
-              <a:t>( </a:t>
-            </a:r>
-            <a:r>
-              <a:rPr lang="hu-HU" sz="1200" dirty="0">
-                <a:latin typeface="Consolas" panose="020B0609020204030204" pitchFamily="49" charset="0"/>
-              </a:rPr>
-              <a:t>Y </a:t>
+              <a:t>- </a:t>
+            </a:r>
+            <a:r>
+              <a:rPr lang="hu-HU" sz="1200" dirty="0">
+                <a:latin typeface="Consolas" panose="020B0609020204030204" pitchFamily="49" charset="0"/>
+              </a:rPr>
+              <a:t>Y_MID </a:t>
             </a:r>
             <a:r>
               <a:rPr lang="hu-HU" sz="1200" dirty="0">
@@ -5917,14 +5926,16 @@
                 </a:solidFill>
                 <a:latin typeface="Consolas" panose="020B0609020204030204" pitchFamily="49" charset="0"/>
               </a:rPr>
-              <a:t>- </a:t>
-            </a:r>
-            <a:r>
-              <a:rPr lang="hu-HU" sz="1200" dirty="0">
-                <a:latin typeface="Consolas" panose="020B0609020204030204" pitchFamily="49" charset="0"/>
-              </a:rPr>
-              <a:t>Y_MID </a:t>
-            </a:r>
+              <a:t>) / </a:t>
+            </a:r>
+            <a:r>
+              <a:rPr lang="hu-HU" sz="1200" dirty="0">
+                <a:latin typeface="Consolas" panose="020B0609020204030204" pitchFamily="49" charset="0"/>
+              </a:rPr>
+              <a:t>Y_MID )</a:t>
+            </a:r>
+          </a:p>
+          <a:p>
             <a:r>
               <a:rPr lang="hu-HU" sz="1200" dirty="0">
                 <a:solidFill>
@@ -5935,16 +5946,16 @@
                 </a:solidFill>
                 <a:latin typeface="Consolas" panose="020B0609020204030204" pitchFamily="49" charset="0"/>
               </a:rPr>
-              <a:t>) /</a:t>
-            </a:r>
-            <a:r>
-              <a:rPr lang="hu-HU" sz="1200" dirty="0">
-                <a:latin typeface="Consolas" panose="020B0609020204030204" pitchFamily="49" charset="0"/>
-              </a:rPr>
-              <a:t>Y_MID</a:t>
-            </a:r>
-          </a:p>
-          <a:p>
+              <a:t>ELSE</a:t>
+            </a:r>
+          </a:p>
+          <a:p>
+            <a:r>
+              <a:rPr lang="hu-HU" sz="1200" dirty="0">
+                <a:latin typeface="Consolas" panose="020B0609020204030204" pitchFamily="49" charset="0"/>
+              </a:rPr>
+              <a:t>  PWM </a:t>
+            </a:r>
             <a:r>
               <a:rPr lang="hu-HU" sz="1200" dirty="0">
                 <a:solidFill>
@@ -5955,15 +5966,13 @@
                 </a:solidFill>
                 <a:latin typeface="Consolas" panose="020B0609020204030204" pitchFamily="49" charset="0"/>
               </a:rPr>
-              <a:t>ELSE</a:t>
-            </a:r>
-          </a:p>
-          <a:p>
-            <a:r>
-              <a:rPr lang="hu-HU" sz="1200" dirty="0">
-                <a:latin typeface="Consolas" panose="020B0609020204030204" pitchFamily="49" charset="0"/>
-              </a:rPr>
-              <a:t>  PWM </a:t>
+              <a:t>= </a:t>
+            </a:r>
+            <a:r>
+              <a:rPr lang="hu-HU" sz="1200" dirty="0">
+                <a:latin typeface="Consolas" panose="020B0609020204030204" pitchFamily="49" charset="0"/>
+              </a:rPr>
+              <a:t>PWM_MAX_BAC </a:t>
             </a:r>
             <a:r>
               <a:rPr lang="hu-HU" sz="1200" dirty="0">
@@ -5975,13 +5984,21 @@
                 </a:solidFill>
                 <a:latin typeface="Consolas" panose="020B0609020204030204" pitchFamily="49" charset="0"/>
               </a:rPr>
-              <a:t>= </a:t>
-            </a:r>
-            <a:r>
-              <a:rPr lang="hu-HU" sz="1200" dirty="0">
-                <a:latin typeface="Consolas" panose="020B0609020204030204" pitchFamily="49" charset="0"/>
-              </a:rPr>
-              <a:t>PWM_MAX_BAC </a:t>
+              <a:t>*</a:t>
+            </a:r>
+            <a:r>
+              <a:rPr lang="hu-HU" sz="1200" dirty="0">
+                <a:latin typeface="Consolas" panose="020B0609020204030204" pitchFamily="49" charset="0"/>
+              </a:rPr>
+              <a:t> </a:t>
+            </a:r>
+          </a:p>
+          <a:p>
+            <a:r>
+              <a:rPr lang="hu-HU" sz="1200" dirty="0">
+                <a:latin typeface="Consolas" panose="020B0609020204030204" pitchFamily="49" charset="0"/>
+              </a:rPr>
+              <a:t>  </a:t>
             </a:r>
             <a:r>
               <a:rPr lang="hu-HU" sz="1200" dirty="0">
@@ -5993,21 +6010,13 @@
                 </a:solidFill>
                 <a:latin typeface="Consolas" panose="020B0609020204030204" pitchFamily="49" charset="0"/>
               </a:rPr>
-              <a:t>*</a:t>
-            </a:r>
-            <a:r>
-              <a:rPr lang="hu-HU" sz="1200" dirty="0">
-                <a:latin typeface="Consolas" panose="020B0609020204030204" pitchFamily="49" charset="0"/>
-              </a:rPr>
-              <a:t> </a:t>
-            </a:r>
-          </a:p>
-          <a:p>
-            <a:r>
-              <a:rPr lang="hu-HU" sz="1200" dirty="0">
-                <a:latin typeface="Consolas" panose="020B0609020204030204" pitchFamily="49" charset="0"/>
-              </a:rPr>
-              <a:t>  </a:t>
+              <a:t>( </a:t>
+            </a:r>
+            <a:r>
+              <a:rPr lang="hu-HU" sz="1200" dirty="0">
+                <a:latin typeface="Consolas" panose="020B0609020204030204" pitchFamily="49" charset="0"/>
+              </a:rPr>
+              <a:t>1 </a:t>
             </a:r>
             <a:r>
               <a:rPr lang="hu-HU" sz="1200" dirty="0">
@@ -6019,13 +6028,13 @@
                 </a:solidFill>
                 <a:latin typeface="Consolas" panose="020B0609020204030204" pitchFamily="49" charset="0"/>
               </a:rPr>
-              <a:t>( </a:t>
-            </a:r>
-            <a:r>
-              <a:rPr lang="hu-HU" sz="1200" dirty="0">
-                <a:latin typeface="Consolas" panose="020B0609020204030204" pitchFamily="49" charset="0"/>
-              </a:rPr>
-              <a:t>1 </a:t>
+              <a:t>+ </a:t>
+            </a:r>
+            <a:r>
+              <a:rPr lang="hu-HU" sz="1200" dirty="0">
+                <a:latin typeface="Consolas" panose="020B0609020204030204" pitchFamily="49" charset="0"/>
+              </a:rPr>
+              <a:t>( Y </a:t>
             </a:r>
             <a:r>
               <a:rPr lang="hu-HU" sz="1200" dirty="0">
@@ -6037,13 +6046,13 @@
                 </a:solidFill>
                 <a:latin typeface="Consolas" panose="020B0609020204030204" pitchFamily="49" charset="0"/>
               </a:rPr>
-              <a:t>+ </a:t>
-            </a:r>
-            <a:r>
-              <a:rPr lang="hu-HU" sz="1200" dirty="0">
-                <a:latin typeface="Consolas" panose="020B0609020204030204" pitchFamily="49" charset="0"/>
-              </a:rPr>
-              <a:t>( Y </a:t>
+              <a:t>/ </a:t>
+            </a:r>
+            <a:r>
+              <a:rPr lang="hu-HU" sz="1200" dirty="0">
+                <a:latin typeface="Consolas" panose="020B0609020204030204" pitchFamily="49" charset="0"/>
+              </a:rPr>
+              <a:t>Y_MID </a:t>
             </a:r>
             <a:r>
               <a:rPr lang="hu-HU" sz="1200" dirty="0">
@@ -6055,16 +6064,12 @@
                 </a:solidFill>
                 <a:latin typeface="Consolas" panose="020B0609020204030204" pitchFamily="49" charset="0"/>
               </a:rPr>
-              <a:t>/ </a:t>
-            </a:r>
-            <a:r>
-              <a:rPr lang="hu-HU" sz="1200" dirty="0">
-                <a:latin typeface="Consolas" panose="020B0609020204030204" pitchFamily="49" charset="0"/>
-              </a:rPr>
-              <a:t>Y_MID </a:t>
-            </a:r>
-            <a:r>
-              <a:rPr lang="hu-HU" sz="1200" dirty="0">
+              <a:t>) )</a:t>
+            </a:r>
+          </a:p>
+          <a:p>
+            <a:r>
+              <a:rPr lang="en-US" sz="1200" b="1" dirty="0">
                 <a:solidFill>
                   <a:schemeClr val="tx2">
                     <a:lumMod val="50000"/>
@@ -6073,8 +6078,41 @@
                 </a:solidFill>
                 <a:latin typeface="Consolas" panose="020B0609020204030204" pitchFamily="49" charset="0"/>
               </a:rPr>
-              <a:t>) )</a:t>
-            </a:r>
+              <a:t>if(fabs(Y - Y_MID) &lt;= </a:t>
+            </a:r>
+            <a:r>
+              <a:rPr lang="hu-HU" sz="1200" b="1" dirty="0">
+                <a:solidFill>
+                  <a:schemeClr val="tx2">
+                    <a:lumMod val="50000"/>
+                    <a:lumOff val="50000"/>
+                  </a:schemeClr>
+                </a:solidFill>
+                <a:latin typeface="Consolas" panose="020B0609020204030204" pitchFamily="49" charset="0"/>
+              </a:rPr>
+              <a:t>1</a:t>
+            </a:r>
+            <a:r>
+              <a:rPr lang="en-US" sz="1200" b="1" dirty="0">
+                <a:solidFill>
+                  <a:schemeClr val="tx2">
+                    <a:lumMod val="50000"/>
+                    <a:lumOff val="50000"/>
+                  </a:schemeClr>
+                </a:solidFill>
+                <a:latin typeface="Consolas" panose="020B0609020204030204" pitchFamily="49" charset="0"/>
+              </a:rPr>
+              <a:t> ) PWM = CEN</a:t>
+            </a:r>
+            <a:endParaRPr lang="hu-HU" sz="1200" b="1" dirty="0">
+              <a:solidFill>
+                <a:schemeClr val="tx2">
+                  <a:lumMod val="50000"/>
+                  <a:lumOff val="50000"/>
+                </a:schemeClr>
+              </a:solidFill>
+              <a:latin typeface="Consolas" panose="020B0609020204030204" pitchFamily="49" charset="0"/>
+            </a:endParaRPr>
           </a:p>
           <a:p>
             <a:endParaRPr lang="hu-HU" sz="1200" dirty="0">

</xml_diff>